<commit_message>
Final: Enviado para revisión OPR & JAMG
</commit_message>
<xml_diff>
--- a/Sistema propuesto.pptx
+++ b/Sistema propuesto.pptx
@@ -262,7 +262,7 @@
           <a:p>
             <a:fld id="{2F57117F-21EA-4F0F-8EAD-57836432C340}" type="datetimeFigureOut">
               <a:rPr lang="es-MX" smtClean="0"/>
-              <a:t>08/03/2020</a:t>
+              <a:t>20/03/2020</a:t>
             </a:fld>
             <a:endParaRPr lang="es-MX"/>
           </a:p>
@@ -462,7 +462,7 @@
           <a:p>
             <a:fld id="{2F57117F-21EA-4F0F-8EAD-57836432C340}" type="datetimeFigureOut">
               <a:rPr lang="es-MX" smtClean="0"/>
-              <a:t>08/03/2020</a:t>
+              <a:t>20/03/2020</a:t>
             </a:fld>
             <a:endParaRPr lang="es-MX"/>
           </a:p>
@@ -672,7 +672,7 @@
           <a:p>
             <a:fld id="{2F57117F-21EA-4F0F-8EAD-57836432C340}" type="datetimeFigureOut">
               <a:rPr lang="es-MX" smtClean="0"/>
-              <a:t>08/03/2020</a:t>
+              <a:t>20/03/2020</a:t>
             </a:fld>
             <a:endParaRPr lang="es-MX"/>
           </a:p>
@@ -872,7 +872,7 @@
           <a:p>
             <a:fld id="{2F57117F-21EA-4F0F-8EAD-57836432C340}" type="datetimeFigureOut">
               <a:rPr lang="es-MX" smtClean="0"/>
-              <a:t>08/03/2020</a:t>
+              <a:t>20/03/2020</a:t>
             </a:fld>
             <a:endParaRPr lang="es-MX"/>
           </a:p>
@@ -1148,7 +1148,7 @@
           <a:p>
             <a:fld id="{2F57117F-21EA-4F0F-8EAD-57836432C340}" type="datetimeFigureOut">
               <a:rPr lang="es-MX" smtClean="0"/>
-              <a:t>08/03/2020</a:t>
+              <a:t>20/03/2020</a:t>
             </a:fld>
             <a:endParaRPr lang="es-MX"/>
           </a:p>
@@ -1416,7 +1416,7 @@
           <a:p>
             <a:fld id="{2F57117F-21EA-4F0F-8EAD-57836432C340}" type="datetimeFigureOut">
               <a:rPr lang="es-MX" smtClean="0"/>
-              <a:t>08/03/2020</a:t>
+              <a:t>20/03/2020</a:t>
             </a:fld>
             <a:endParaRPr lang="es-MX"/>
           </a:p>
@@ -1831,7 +1831,7 @@
           <a:p>
             <a:fld id="{2F57117F-21EA-4F0F-8EAD-57836432C340}" type="datetimeFigureOut">
               <a:rPr lang="es-MX" smtClean="0"/>
-              <a:t>08/03/2020</a:t>
+              <a:t>20/03/2020</a:t>
             </a:fld>
             <a:endParaRPr lang="es-MX"/>
           </a:p>
@@ -1973,7 +1973,7 @@
           <a:p>
             <a:fld id="{2F57117F-21EA-4F0F-8EAD-57836432C340}" type="datetimeFigureOut">
               <a:rPr lang="es-MX" smtClean="0"/>
-              <a:t>08/03/2020</a:t>
+              <a:t>20/03/2020</a:t>
             </a:fld>
             <a:endParaRPr lang="es-MX"/>
           </a:p>
@@ -2086,7 +2086,7 @@
           <a:p>
             <a:fld id="{2F57117F-21EA-4F0F-8EAD-57836432C340}" type="datetimeFigureOut">
               <a:rPr lang="es-MX" smtClean="0"/>
-              <a:t>08/03/2020</a:t>
+              <a:t>20/03/2020</a:t>
             </a:fld>
             <a:endParaRPr lang="es-MX"/>
           </a:p>
@@ -2399,7 +2399,7 @@
           <a:p>
             <a:fld id="{2F57117F-21EA-4F0F-8EAD-57836432C340}" type="datetimeFigureOut">
               <a:rPr lang="es-MX" smtClean="0"/>
-              <a:t>08/03/2020</a:t>
+              <a:t>20/03/2020</a:t>
             </a:fld>
             <a:endParaRPr lang="es-MX"/>
           </a:p>
@@ -2688,7 +2688,7 @@
           <a:p>
             <a:fld id="{2F57117F-21EA-4F0F-8EAD-57836432C340}" type="datetimeFigureOut">
               <a:rPr lang="es-MX" smtClean="0"/>
-              <a:t>08/03/2020</a:t>
+              <a:t>20/03/2020</a:t>
             </a:fld>
             <a:endParaRPr lang="es-MX"/>
           </a:p>
@@ -2931,7 +2931,7 @@
           <a:p>
             <a:fld id="{2F57117F-21EA-4F0F-8EAD-57836432C340}" type="datetimeFigureOut">
               <a:rPr lang="es-MX" smtClean="0"/>
-              <a:t>08/03/2020</a:t>
+              <a:t>20/03/2020</a:t>
             </a:fld>
             <a:endParaRPr lang="es-MX"/>
           </a:p>
@@ -5277,36 +5277,12 @@
           <a:p>
             <a:pPr algn="ctr"/>
             <a:r>
-              <a:rPr lang="es-ES" b="1" dirty="0" err="1">
-                <a:solidFill>
-                  <a:schemeClr val="tx1"/>
-                </a:solidFill>
-              </a:rPr>
-              <a:t>Reha</a:t>
-            </a:r>
-            <a:r>
               <a:rPr lang="es-ES" b="1" dirty="0">
                 <a:solidFill>
                   <a:schemeClr val="tx1"/>
                 </a:solidFill>
               </a:rPr>
-              <a:t> </a:t>
-            </a:r>
-            <a:r>
-              <a:rPr lang="es-ES" b="1" dirty="0" err="1">
-                <a:solidFill>
-                  <a:schemeClr val="tx1"/>
-                </a:solidFill>
-              </a:rPr>
-              <a:t>Stim</a:t>
-            </a:r>
-            <a:r>
-              <a:rPr lang="es-ES" b="1" dirty="0">
-                <a:solidFill>
-                  <a:schemeClr val="tx1"/>
-                </a:solidFill>
-              </a:rPr>
-              <a:t> 2</a:t>
+              <a:t>RehaMove 2</a:t>
             </a:r>
             <a:endParaRPr lang="es-MX" b="1" dirty="0">
               <a:solidFill>
@@ -5936,20 +5912,12 @@
           <a:p>
             <a:pPr algn="ctr"/>
             <a:r>
-              <a:rPr lang="es-ES" b="1">
-                <a:solidFill>
-                  <a:schemeClr val="tx1"/>
-                </a:solidFill>
-              </a:rPr>
-              <a:t>Reha Stim</a:t>
-            </a:r>
-            <a:r>
               <a:rPr lang="es-ES" b="1" dirty="0">
                 <a:solidFill>
                   <a:schemeClr val="tx1"/>
                 </a:solidFill>
               </a:rPr>
-              <a:t> 2</a:t>
+              <a:t>RehaMove 2</a:t>
             </a:r>
             <a:endParaRPr lang="es-MX" b="1" dirty="0">
               <a:solidFill>

</xml_diff>

<commit_message>
Comentarios OPR & JAMG
</commit_message>
<xml_diff>
--- a/Sistema propuesto.pptx
+++ b/Sistema propuesto.pptx
@@ -262,7 +262,7 @@
           <a:p>
             <a:fld id="{2F57117F-21EA-4F0F-8EAD-57836432C340}" type="datetimeFigureOut">
               <a:rPr lang="es-MX" smtClean="0"/>
-              <a:t>08/03/2020</a:t>
+              <a:t>20/03/2020</a:t>
             </a:fld>
             <a:endParaRPr lang="es-MX"/>
           </a:p>
@@ -462,7 +462,7 @@
           <a:p>
             <a:fld id="{2F57117F-21EA-4F0F-8EAD-57836432C340}" type="datetimeFigureOut">
               <a:rPr lang="es-MX" smtClean="0"/>
-              <a:t>08/03/2020</a:t>
+              <a:t>20/03/2020</a:t>
             </a:fld>
             <a:endParaRPr lang="es-MX"/>
           </a:p>
@@ -672,7 +672,7 @@
           <a:p>
             <a:fld id="{2F57117F-21EA-4F0F-8EAD-57836432C340}" type="datetimeFigureOut">
               <a:rPr lang="es-MX" smtClean="0"/>
-              <a:t>08/03/2020</a:t>
+              <a:t>20/03/2020</a:t>
             </a:fld>
             <a:endParaRPr lang="es-MX"/>
           </a:p>
@@ -872,7 +872,7 @@
           <a:p>
             <a:fld id="{2F57117F-21EA-4F0F-8EAD-57836432C340}" type="datetimeFigureOut">
               <a:rPr lang="es-MX" smtClean="0"/>
-              <a:t>08/03/2020</a:t>
+              <a:t>20/03/2020</a:t>
             </a:fld>
             <a:endParaRPr lang="es-MX"/>
           </a:p>
@@ -1148,7 +1148,7 @@
           <a:p>
             <a:fld id="{2F57117F-21EA-4F0F-8EAD-57836432C340}" type="datetimeFigureOut">
               <a:rPr lang="es-MX" smtClean="0"/>
-              <a:t>08/03/2020</a:t>
+              <a:t>20/03/2020</a:t>
             </a:fld>
             <a:endParaRPr lang="es-MX"/>
           </a:p>
@@ -1416,7 +1416,7 @@
           <a:p>
             <a:fld id="{2F57117F-21EA-4F0F-8EAD-57836432C340}" type="datetimeFigureOut">
               <a:rPr lang="es-MX" smtClean="0"/>
-              <a:t>08/03/2020</a:t>
+              <a:t>20/03/2020</a:t>
             </a:fld>
             <a:endParaRPr lang="es-MX"/>
           </a:p>
@@ -1831,7 +1831,7 @@
           <a:p>
             <a:fld id="{2F57117F-21EA-4F0F-8EAD-57836432C340}" type="datetimeFigureOut">
               <a:rPr lang="es-MX" smtClean="0"/>
-              <a:t>08/03/2020</a:t>
+              <a:t>20/03/2020</a:t>
             </a:fld>
             <a:endParaRPr lang="es-MX"/>
           </a:p>
@@ -1973,7 +1973,7 @@
           <a:p>
             <a:fld id="{2F57117F-21EA-4F0F-8EAD-57836432C340}" type="datetimeFigureOut">
               <a:rPr lang="es-MX" smtClean="0"/>
-              <a:t>08/03/2020</a:t>
+              <a:t>20/03/2020</a:t>
             </a:fld>
             <a:endParaRPr lang="es-MX"/>
           </a:p>
@@ -2086,7 +2086,7 @@
           <a:p>
             <a:fld id="{2F57117F-21EA-4F0F-8EAD-57836432C340}" type="datetimeFigureOut">
               <a:rPr lang="es-MX" smtClean="0"/>
-              <a:t>08/03/2020</a:t>
+              <a:t>20/03/2020</a:t>
             </a:fld>
             <a:endParaRPr lang="es-MX"/>
           </a:p>
@@ -2399,7 +2399,7 @@
           <a:p>
             <a:fld id="{2F57117F-21EA-4F0F-8EAD-57836432C340}" type="datetimeFigureOut">
               <a:rPr lang="es-MX" smtClean="0"/>
-              <a:t>08/03/2020</a:t>
+              <a:t>20/03/2020</a:t>
             </a:fld>
             <a:endParaRPr lang="es-MX"/>
           </a:p>
@@ -2688,7 +2688,7 @@
           <a:p>
             <a:fld id="{2F57117F-21EA-4F0F-8EAD-57836432C340}" type="datetimeFigureOut">
               <a:rPr lang="es-MX" smtClean="0"/>
-              <a:t>08/03/2020</a:t>
+              <a:t>20/03/2020</a:t>
             </a:fld>
             <a:endParaRPr lang="es-MX"/>
           </a:p>
@@ -2931,7 +2931,7 @@
           <a:p>
             <a:fld id="{2F57117F-21EA-4F0F-8EAD-57836432C340}" type="datetimeFigureOut">
               <a:rPr lang="es-MX" smtClean="0"/>
-              <a:t>08/03/2020</a:t>
+              <a:t>20/03/2020</a:t>
             </a:fld>
             <a:endParaRPr lang="es-MX"/>
           </a:p>
@@ -5277,36 +5277,12 @@
           <a:p>
             <a:pPr algn="ctr"/>
             <a:r>
-              <a:rPr lang="es-ES" b="1" dirty="0" err="1">
-                <a:solidFill>
-                  <a:schemeClr val="tx1"/>
-                </a:solidFill>
-              </a:rPr>
-              <a:t>Reha</a:t>
-            </a:r>
-            <a:r>
               <a:rPr lang="es-ES" b="1" dirty="0">
                 <a:solidFill>
                   <a:schemeClr val="tx1"/>
                 </a:solidFill>
               </a:rPr>
-              <a:t> </a:t>
-            </a:r>
-            <a:r>
-              <a:rPr lang="es-ES" b="1" dirty="0" err="1">
-                <a:solidFill>
-                  <a:schemeClr val="tx1"/>
-                </a:solidFill>
-              </a:rPr>
-              <a:t>Stim</a:t>
-            </a:r>
-            <a:r>
-              <a:rPr lang="es-ES" b="1" dirty="0">
-                <a:solidFill>
-                  <a:schemeClr val="tx1"/>
-                </a:solidFill>
-              </a:rPr>
-              <a:t> 2</a:t>
+              <a:t>RehaMove 2</a:t>
             </a:r>
             <a:endParaRPr lang="es-MX" b="1" dirty="0">
               <a:solidFill>
@@ -5936,20 +5912,12 @@
           <a:p>
             <a:pPr algn="ctr"/>
             <a:r>
-              <a:rPr lang="es-ES" b="1">
-                <a:solidFill>
-                  <a:schemeClr val="tx1"/>
-                </a:solidFill>
-              </a:rPr>
-              <a:t>Reha Stim</a:t>
-            </a:r>
-            <a:r>
               <a:rPr lang="es-ES" b="1" dirty="0">
                 <a:solidFill>
                   <a:schemeClr val="tx1"/>
                 </a:solidFill>
               </a:rPr>
-              <a:t> 2</a:t>
+              <a:t>RehaMove 2</a:t>
             </a:r>
             <a:endParaRPr lang="es-MX" b="1" dirty="0">
               <a:solidFill>

</xml_diff>